<commit_message>
Formation OO en cours
</commit_message>
<xml_diff>
--- a/CSS/1. Présentation/Cours CSS - v1.0.pptx
+++ b/CSS/1. Présentation/Cours CSS - v1.0.pptx
@@ -170,6 +170,10 @@
     </p:extLst>
   </p:cmAuthor>
 </p:cmAuthorLst>
+</file>
+
+<file path=ppt/revisionInfo.xml><?xml version="1.0" encoding="utf-8"?>
+<p1510:revInfo xmlns:a="http://schemas.openxmlformats.org/drawingml/2006/main" xmlns:r="http://schemas.openxmlformats.org/officeDocument/2006/relationships" xmlns:p1510="http://schemas.microsoft.com/office/powerpoint/2015/10/main"/>
 </file>
 
 <file path=ppt/diagrams/colors1.xml><?xml version="1.0" encoding="utf-8"?>
@@ -4228,7 +4232,7 @@
           <a:p>
             <a:fld id="{83484A92-80DB-45F2-84F5-0D1BF1E89935}" type="datetimeFigureOut">
               <a:rPr lang="fr-CA" smtClean="0"/>
-              <a:t>2018-04-20</a:t>
+              <a:t>2018-05-14</a:t>
             </a:fld>
             <a:endParaRPr lang="fr-CA"/>
           </a:p>
@@ -4627,7 +4631,7 @@
           <a:p>
             <a:fld id="{7946004B-0E6B-4AC3-A8D3-BFF0512C2F93}" type="datetimeFigureOut">
               <a:rPr lang="fr-CA" smtClean="0"/>
-              <a:t>2018-04-20</a:t>
+              <a:t>2018-05-14</a:t>
             </a:fld>
             <a:endParaRPr lang="fr-CA"/>
           </a:p>
@@ -4797,7 +4801,7 @@
           <a:p>
             <a:fld id="{7946004B-0E6B-4AC3-A8D3-BFF0512C2F93}" type="datetimeFigureOut">
               <a:rPr lang="fr-CA" smtClean="0"/>
-              <a:t>2018-04-20</a:t>
+              <a:t>2018-05-14</a:t>
             </a:fld>
             <a:endParaRPr lang="fr-CA"/>
           </a:p>
@@ -4977,7 +4981,7 @@
           <a:p>
             <a:fld id="{7946004B-0E6B-4AC3-A8D3-BFF0512C2F93}" type="datetimeFigureOut">
               <a:rPr lang="fr-CA" smtClean="0"/>
-              <a:t>2018-04-20</a:t>
+              <a:t>2018-05-14</a:t>
             </a:fld>
             <a:endParaRPr lang="fr-CA"/>
           </a:p>
@@ -5147,7 +5151,7 @@
           <a:p>
             <a:fld id="{7946004B-0E6B-4AC3-A8D3-BFF0512C2F93}" type="datetimeFigureOut">
               <a:rPr lang="fr-CA" smtClean="0"/>
-              <a:t>2018-04-20</a:t>
+              <a:t>2018-05-14</a:t>
             </a:fld>
             <a:endParaRPr lang="fr-CA"/>
           </a:p>
@@ -5393,7 +5397,7 @@
           <a:p>
             <a:fld id="{7946004B-0E6B-4AC3-A8D3-BFF0512C2F93}" type="datetimeFigureOut">
               <a:rPr lang="fr-CA" smtClean="0"/>
-              <a:t>2018-04-20</a:t>
+              <a:t>2018-05-14</a:t>
             </a:fld>
             <a:endParaRPr lang="fr-CA"/>
           </a:p>
@@ -5625,7 +5629,7 @@
           <a:p>
             <a:fld id="{7946004B-0E6B-4AC3-A8D3-BFF0512C2F93}" type="datetimeFigureOut">
               <a:rPr lang="fr-CA" smtClean="0"/>
-              <a:t>2018-04-20</a:t>
+              <a:t>2018-05-14</a:t>
             </a:fld>
             <a:endParaRPr lang="fr-CA"/>
           </a:p>
@@ -5992,7 +5996,7 @@
           <a:p>
             <a:fld id="{7946004B-0E6B-4AC3-A8D3-BFF0512C2F93}" type="datetimeFigureOut">
               <a:rPr lang="fr-CA" smtClean="0"/>
-              <a:t>2018-04-20</a:t>
+              <a:t>2018-05-14</a:t>
             </a:fld>
             <a:endParaRPr lang="fr-CA"/>
           </a:p>
@@ -6110,7 +6114,7 @@
           <a:p>
             <a:fld id="{7946004B-0E6B-4AC3-A8D3-BFF0512C2F93}" type="datetimeFigureOut">
               <a:rPr lang="fr-CA" smtClean="0"/>
-              <a:t>2018-04-20</a:t>
+              <a:t>2018-05-14</a:t>
             </a:fld>
             <a:endParaRPr lang="fr-CA"/>
           </a:p>
@@ -6205,7 +6209,7 @@
           <a:p>
             <a:fld id="{7946004B-0E6B-4AC3-A8D3-BFF0512C2F93}" type="datetimeFigureOut">
               <a:rPr lang="fr-CA" smtClean="0"/>
-              <a:t>2018-04-20</a:t>
+              <a:t>2018-05-14</a:t>
             </a:fld>
             <a:endParaRPr lang="fr-CA"/>
           </a:p>
@@ -6482,7 +6486,7 @@
           <a:p>
             <a:fld id="{7946004B-0E6B-4AC3-A8D3-BFF0512C2F93}" type="datetimeFigureOut">
               <a:rPr lang="fr-CA" smtClean="0"/>
-              <a:t>2018-04-20</a:t>
+              <a:t>2018-05-14</a:t>
             </a:fld>
             <a:endParaRPr lang="fr-CA"/>
           </a:p>
@@ -6739,7 +6743,7 @@
           <a:p>
             <a:fld id="{7946004B-0E6B-4AC3-A8D3-BFF0512C2F93}" type="datetimeFigureOut">
               <a:rPr lang="fr-CA" smtClean="0"/>
-              <a:t>2018-04-20</a:t>
+              <a:t>2018-05-14</a:t>
             </a:fld>
             <a:endParaRPr lang="fr-CA"/>
           </a:p>
@@ -6952,7 +6956,7 @@
           <a:p>
             <a:fld id="{7946004B-0E6B-4AC3-A8D3-BFF0512C2F93}" type="datetimeFigureOut">
               <a:rPr lang="fr-CA" smtClean="0"/>
-              <a:t>2018-04-20</a:t>
+              <a:t>2018-05-14</a:t>
             </a:fld>
             <a:endParaRPr lang="fr-CA"/>
           </a:p>
@@ -7537,7 +7541,7 @@
           <a:p>
             <a:r>
               <a:rPr lang="fr-CA" dirty="0"/>
-              <a:t>DV22-0118-1</a:t>
+              <a:t>DV22-0118-2</a:t>
             </a:r>
           </a:p>
         </p:txBody>

</xml_diff>